<commit_message>
Track large CSV with Git LFS
</commit_message>
<xml_diff>
--- a/Data Analytics Job Postings Insights.pptx
+++ b/Data Analytics Job Postings Insights.pptx
@@ -16,6 +16,9 @@
     <p:sldId id="262" r:id="rId10"/>
     <p:sldId id="263" r:id="rId11"/>
     <p:sldId id="266" r:id="rId12"/>
+    <p:sldId id="267" r:id="rId13"/>
+    <p:sldId id="268" r:id="rId14"/>
+    <p:sldId id="269" r:id="rId15"/>
   </p:sldIdLst>
   <p:sldSz cx="12192000" cy="6858000"/>
   <p:notesSz cx="6858000" cy="9144000"/>
@@ -271,7 +274,7 @@
           <a:p>
             <a:fld id="{16853237-A186-483F-A6C9-A62AC10C6B6D}" type="datetimeFigureOut">
               <a:rPr lang="en-KE" smtClean="0"/>
-              <a:t>11/28/2025</a:t>
+              <a:t>11/30/2025</a:t>
             </a:fld>
             <a:endParaRPr lang="en-KE"/>
           </a:p>
@@ -471,7 +474,7 @@
           <a:p>
             <a:fld id="{16853237-A186-483F-A6C9-A62AC10C6B6D}" type="datetimeFigureOut">
               <a:rPr lang="en-KE" smtClean="0"/>
-              <a:t>11/28/2025</a:t>
+              <a:t>11/30/2025</a:t>
             </a:fld>
             <a:endParaRPr lang="en-KE"/>
           </a:p>
@@ -681,7 +684,7 @@
           <a:p>
             <a:fld id="{16853237-A186-483F-A6C9-A62AC10C6B6D}" type="datetimeFigureOut">
               <a:rPr lang="en-KE" smtClean="0"/>
-              <a:t>11/28/2025</a:t>
+              <a:t>11/30/2025</a:t>
             </a:fld>
             <a:endParaRPr lang="en-KE"/>
           </a:p>
@@ -881,7 +884,7 @@
           <a:p>
             <a:fld id="{16853237-A186-483F-A6C9-A62AC10C6B6D}" type="datetimeFigureOut">
               <a:rPr lang="en-KE" smtClean="0"/>
-              <a:t>11/28/2025</a:t>
+              <a:t>11/30/2025</a:t>
             </a:fld>
             <a:endParaRPr lang="en-KE"/>
           </a:p>
@@ -1157,7 +1160,7 @@
           <a:p>
             <a:fld id="{16853237-A186-483F-A6C9-A62AC10C6B6D}" type="datetimeFigureOut">
               <a:rPr lang="en-KE" smtClean="0"/>
-              <a:t>11/28/2025</a:t>
+              <a:t>11/30/2025</a:t>
             </a:fld>
             <a:endParaRPr lang="en-KE"/>
           </a:p>
@@ -1425,7 +1428,7 @@
           <a:p>
             <a:fld id="{16853237-A186-483F-A6C9-A62AC10C6B6D}" type="datetimeFigureOut">
               <a:rPr lang="en-KE" smtClean="0"/>
-              <a:t>11/28/2025</a:t>
+              <a:t>11/30/2025</a:t>
             </a:fld>
             <a:endParaRPr lang="en-KE"/>
           </a:p>
@@ -1840,7 +1843,7 @@
           <a:p>
             <a:fld id="{16853237-A186-483F-A6C9-A62AC10C6B6D}" type="datetimeFigureOut">
               <a:rPr lang="en-KE" smtClean="0"/>
-              <a:t>11/28/2025</a:t>
+              <a:t>11/30/2025</a:t>
             </a:fld>
             <a:endParaRPr lang="en-KE"/>
           </a:p>
@@ -1982,7 +1985,7 @@
           <a:p>
             <a:fld id="{16853237-A186-483F-A6C9-A62AC10C6B6D}" type="datetimeFigureOut">
               <a:rPr lang="en-KE" smtClean="0"/>
-              <a:t>11/28/2025</a:t>
+              <a:t>11/30/2025</a:t>
             </a:fld>
             <a:endParaRPr lang="en-KE"/>
           </a:p>
@@ -2095,7 +2098,7 @@
           <a:p>
             <a:fld id="{16853237-A186-483F-A6C9-A62AC10C6B6D}" type="datetimeFigureOut">
               <a:rPr lang="en-KE" smtClean="0"/>
-              <a:t>11/28/2025</a:t>
+              <a:t>11/30/2025</a:t>
             </a:fld>
             <a:endParaRPr lang="en-KE"/>
           </a:p>
@@ -2408,7 +2411,7 @@
           <a:p>
             <a:fld id="{16853237-A186-483F-A6C9-A62AC10C6B6D}" type="datetimeFigureOut">
               <a:rPr lang="en-KE" smtClean="0"/>
-              <a:t>11/28/2025</a:t>
+              <a:t>11/30/2025</a:t>
             </a:fld>
             <a:endParaRPr lang="en-KE"/>
           </a:p>
@@ -2697,7 +2700,7 @@
           <a:p>
             <a:fld id="{16853237-A186-483F-A6C9-A62AC10C6B6D}" type="datetimeFigureOut">
               <a:rPr lang="en-KE" smtClean="0"/>
-              <a:t>11/28/2025</a:t>
+              <a:t>11/30/2025</a:t>
             </a:fld>
             <a:endParaRPr lang="en-KE"/>
           </a:p>
@@ -2940,7 +2943,7 @@
           <a:p>
             <a:fld id="{16853237-A186-483F-A6C9-A62AC10C6B6D}" type="datetimeFigureOut">
               <a:rPr lang="en-KE" smtClean="0"/>
-              <a:t>11/28/2025</a:t>
+              <a:t>11/30/2025</a:t>
             </a:fld>
             <a:endParaRPr lang="en-KE"/>
           </a:p>
@@ -3655,6 +3658,253 @@
 </p:sld>
 </file>
 
+<file path=ppt/slides/slide12.xml><?xml version="1.0" encoding="utf-8"?>
+<p:sld xmlns:a="http://schemas.openxmlformats.org/drawingml/2006/main" xmlns:r="http://schemas.openxmlformats.org/officeDocument/2006/relationships" xmlns:p="http://schemas.openxmlformats.org/presentationml/2006/main">
+  <p:cSld>
+    <p:spTree>
+      <p:nvGrpSpPr>
+        <p:cNvPr id="1" name=""/>
+        <p:cNvGrpSpPr/>
+        <p:nvPr/>
+      </p:nvGrpSpPr>
+      <p:grpSpPr>
+        <a:xfrm>
+          <a:off x="0" y="0"/>
+          <a:ext cx="0" cy="0"/>
+          <a:chOff x="0" y="0"/>
+          <a:chExt cx="0" cy="0"/>
+        </a:xfrm>
+      </p:grpSpPr>
+      <p:sp>
+        <p:nvSpPr>
+          <p:cNvPr id="3" name="TextBox 2">
+            <a:extLst>
+              <a:ext uri="{FF2B5EF4-FFF2-40B4-BE49-F238E27FC236}">
+                <a16:creationId xmlns:a16="http://schemas.microsoft.com/office/drawing/2014/main" id="{D58FAD67-2A5F-436D-B7FC-0575EFA99787}"/>
+              </a:ext>
+            </a:extLst>
+          </p:cNvPr>
+          <p:cNvSpPr txBox="1"/>
+          <p:nvPr/>
+        </p:nvSpPr>
+        <p:spPr>
+          <a:xfrm>
+            <a:off x="914399" y="1859340"/>
+            <a:ext cx="10182225" cy="4462760"/>
+          </a:xfrm>
+          <a:prstGeom prst="rect">
+            <a:avLst/>
+          </a:prstGeom>
+          <a:noFill/>
+        </p:spPr>
+        <p:txBody>
+          <a:bodyPr wrap="square">
+            <a:spAutoFit/>
+          </a:bodyPr>
+          <a:lstStyle/>
+          <a:p>
+            <a:pPr algn="ctr"/>
+            <a:r>
+              <a:rPr lang="en-US" sz="3200" b="1" dirty="0"/>
+              <a:t>Discussion</a:t>
+            </a:r>
+          </a:p>
+          <a:p>
+            <a:pPr algn="ctr"/>
+            <a:endParaRPr lang="en-US" dirty="0"/>
+          </a:p>
+          <a:p>
+            <a:r>
+              <a:rPr lang="en-US" dirty="0"/>
+              <a:t>The analysis of the job-postings dataset reveals several essential insights into the current landscape of data-related roles. First, contract positions consistently offer higher pay ranges than full-time or part-time roles. This aligns with broader industry patterns, where contract roles often compensate for the lack of long-term job security and benefits by offering higher hourly or project-based rates. For job seekers looking to maximize short-term earnings or individuals comfortable with flexible work arrangements, contract roles present a strong opportunity.</a:t>
+            </a:r>
+          </a:p>
+          <a:p>
+            <a:endParaRPr lang="en-US" dirty="0"/>
+          </a:p>
+          <a:p>
+            <a:r>
+              <a:rPr lang="en-US" dirty="0"/>
+              <a:t>Another noteworthy finding is that most job postings do not specify a formal degree requirement, regardless of job type. This reflects a growing trend across the technology and data sectors, where employers increasingly prioritize hands-on experience, practical skills, and portfolio projects over traditional qualifications. The shift suggests that individuals without formal data analytics education can still access high-value roles if they demonstrate competence through real-world projects, certifications, or strong technical proficiency.</a:t>
+            </a:r>
+          </a:p>
+        </p:txBody>
+      </p:sp>
+    </p:spTree>
+    <p:extLst>
+      <p:ext uri="{BB962C8B-B14F-4D97-AF65-F5344CB8AC3E}">
+        <p14:creationId xmlns:p14="http://schemas.microsoft.com/office/powerpoint/2010/main" val="4213302727"/>
+      </p:ext>
+    </p:extLst>
+  </p:cSld>
+  <p:clrMapOvr>
+    <a:masterClrMapping/>
+  </p:clrMapOvr>
+</p:sld>
+</file>
+
+<file path=ppt/slides/slide13.xml><?xml version="1.0" encoding="utf-8"?>
+<p:sld xmlns:a="http://schemas.openxmlformats.org/drawingml/2006/main" xmlns:r="http://schemas.openxmlformats.org/officeDocument/2006/relationships" xmlns:p="http://schemas.openxmlformats.org/presentationml/2006/main">
+  <p:cSld>
+    <p:spTree>
+      <p:nvGrpSpPr>
+        <p:cNvPr id="1" name=""/>
+        <p:cNvGrpSpPr/>
+        <p:nvPr/>
+      </p:nvGrpSpPr>
+      <p:grpSpPr>
+        <a:xfrm>
+          <a:off x="0" y="0"/>
+          <a:ext cx="0" cy="0"/>
+          <a:chOff x="0" y="0"/>
+          <a:chExt cx="0" cy="0"/>
+        </a:xfrm>
+      </p:grpSpPr>
+      <p:sp>
+        <p:nvSpPr>
+          <p:cNvPr id="3" name="TextBox 2">
+            <a:extLst>
+              <a:ext uri="{FF2B5EF4-FFF2-40B4-BE49-F238E27FC236}">
+                <a16:creationId xmlns:a16="http://schemas.microsoft.com/office/drawing/2014/main" id="{B56532E1-BA42-4334-ADE9-193054A4B1F0}"/>
+              </a:ext>
+            </a:extLst>
+          </p:cNvPr>
+          <p:cNvSpPr txBox="1"/>
+          <p:nvPr/>
+        </p:nvSpPr>
+        <p:spPr>
+          <a:xfrm>
+            <a:off x="1285875" y="1166843"/>
+            <a:ext cx="9620249" cy="3416320"/>
+          </a:xfrm>
+          <a:prstGeom prst="rect">
+            <a:avLst/>
+          </a:prstGeom>
+          <a:noFill/>
+        </p:spPr>
+        <p:txBody>
+          <a:bodyPr wrap="square">
+            <a:spAutoFit/>
+          </a:bodyPr>
+          <a:lstStyle/>
+          <a:p>
+            <a:r>
+              <a:rPr lang="en-US" dirty="0"/>
+              <a:t>The dataset also shows that LinkedIn is the dominant platform for job postings, far surpassing other sources. This emphasizes LinkedIn’s importance as a central hub for both job discovery and professional visibility. For job seekers, maintaining an optimized and active LinkedIn profile is essential, as it increases exposure to recruiters and aligns with where employers are posting the majority of opportunities.</a:t>
+            </a:r>
+          </a:p>
+          <a:p>
+            <a:endParaRPr lang="en-US" dirty="0"/>
+          </a:p>
+          <a:p>
+            <a:r>
+              <a:rPr lang="en-US" dirty="0"/>
+              <a:t>In terms of required skills, Python, SQL, and Excel emerge as the most frequently requested across all job categories. These three tools form the core technical stack for modern data work. Python supports automation, machine learning, and scripting; SQL remains fundamental for database querying; and Excel continues to be widely used for exploratory analysis, business reporting, and rapid prototyping. Their dominance highlights that employers expect candidates to be versatile in both programming and traditional analytical tools.</a:t>
+            </a:r>
+          </a:p>
+        </p:txBody>
+      </p:sp>
+    </p:spTree>
+    <p:extLst>
+      <p:ext uri="{BB962C8B-B14F-4D97-AF65-F5344CB8AC3E}">
+        <p14:creationId xmlns:p14="http://schemas.microsoft.com/office/powerpoint/2010/main" val="4016257372"/>
+      </p:ext>
+    </p:extLst>
+  </p:cSld>
+  <p:clrMapOvr>
+    <a:masterClrMapping/>
+  </p:clrMapOvr>
+</p:sld>
+</file>
+
+<file path=ppt/slides/slide14.xml><?xml version="1.0" encoding="utf-8"?>
+<p:sld xmlns:a="http://schemas.openxmlformats.org/drawingml/2006/main" xmlns:r="http://schemas.openxmlformats.org/officeDocument/2006/relationships" xmlns:p="http://schemas.openxmlformats.org/presentationml/2006/main">
+  <p:cSld>
+    <p:spTree>
+      <p:nvGrpSpPr>
+        <p:cNvPr id="1" name=""/>
+        <p:cNvGrpSpPr/>
+        <p:nvPr/>
+      </p:nvGrpSpPr>
+      <p:grpSpPr>
+        <a:xfrm>
+          <a:off x="0" y="0"/>
+          <a:ext cx="0" cy="0"/>
+          <a:chOff x="0" y="0"/>
+          <a:chExt cx="0" cy="0"/>
+        </a:xfrm>
+      </p:grpSpPr>
+      <p:sp>
+        <p:nvSpPr>
+          <p:cNvPr id="3" name="TextBox 2">
+            <a:extLst>
+              <a:ext uri="{FF2B5EF4-FFF2-40B4-BE49-F238E27FC236}">
+                <a16:creationId xmlns:a16="http://schemas.microsoft.com/office/drawing/2014/main" id="{5AFAEC4A-0607-49BC-ADDB-84CD10F159B8}"/>
+              </a:ext>
+            </a:extLst>
+          </p:cNvPr>
+          <p:cNvSpPr txBox="1"/>
+          <p:nvPr/>
+        </p:nvSpPr>
+        <p:spPr>
+          <a:xfrm>
+            <a:off x="1162050" y="751344"/>
+            <a:ext cx="8991600" cy="4185761"/>
+          </a:xfrm>
+          <a:prstGeom prst="rect">
+            <a:avLst/>
+          </a:prstGeom>
+          <a:noFill/>
+        </p:spPr>
+        <p:txBody>
+          <a:bodyPr wrap="square">
+            <a:spAutoFit/>
+          </a:bodyPr>
+          <a:lstStyle/>
+          <a:p>
+            <a:pPr algn="ctr"/>
+            <a:r>
+              <a:rPr lang="en-US" dirty="0"/>
+              <a:t> </a:t>
+            </a:r>
+            <a:r>
+              <a:rPr lang="en-US" sz="3200" b="1" dirty="0"/>
+              <a:t>Conclusion</a:t>
+            </a:r>
+          </a:p>
+          <a:p>
+            <a:endParaRPr lang="en-US" dirty="0"/>
+          </a:p>
+          <a:p>
+            <a:r>
+              <a:rPr lang="en-US" dirty="0"/>
+              <a:t>Overall, the findings indicate a job market that highly values skills, flexibility, and visibility. Contract roles offer strong compensation opportunities, suggesting that skill-driven specialists can earn more through short-term engagements. The lack of strict degree requirements reflects a shift toward skills-based hiring, making data roles more accessible to non-traditional learners. With most job postings concentrated on LinkedIn, job seekers should prioritize building a strong online presence and actively engaging on the platform.</a:t>
+            </a:r>
+          </a:p>
+          <a:p>
+            <a:endParaRPr lang="en-US" dirty="0"/>
+          </a:p>
+          <a:p>
+            <a:r>
+              <a:rPr lang="en-US" dirty="0"/>
+              <a:t>Finally, with Python, SQL, and Excel consistently ranking as the most in-demand skills, aspiring data professionals should focus their learning paths around these tools. Mastery of this core technical stack significantly increases employability across a wide range of analytical and business intelligence roles. Together, these insights provide a clear roadmap for anyone looking to enter or advance in the data job market.</a:t>
+            </a:r>
+          </a:p>
+        </p:txBody>
+      </p:sp>
+    </p:spTree>
+    <p:extLst>
+      <p:ext uri="{BB962C8B-B14F-4D97-AF65-F5344CB8AC3E}">
+        <p14:creationId xmlns:p14="http://schemas.microsoft.com/office/powerpoint/2010/main" val="2180802969"/>
+      </p:ext>
+    </p:extLst>
+  </p:cSld>
+  <p:clrMapOvr>
+    <a:masterClrMapping/>
+  </p:clrMapOvr>
+</p:sld>
+</file>
+
 <file path=ppt/slides/slide2.xml><?xml version="1.0" encoding="utf-8"?>
 <p:sld xmlns:a="http://schemas.openxmlformats.org/drawingml/2006/main" xmlns:r="http://schemas.openxmlformats.org/officeDocument/2006/relationships" xmlns:p="http://schemas.openxmlformats.org/presentationml/2006/main">
   <p:cSld>
@@ -3847,7 +4097,7 @@
             </a:pPr>
             <a:r>
               <a:rPr lang="en-US" dirty="0"/>
-              <a:t>In this project, I analyzed a comprehensive dataset containing job requirements across multiple data-related roles, including Data Analyst, Data Scientist, Data Engineer, BI Analyst, Machine Learning Engineer, and other emerging data careers. The goal was to understand skill demands, role patterns, and the relationship between technical competencies and job categories</a:t>
+              <a:t>In this project, I analyzed a comprehensive dataset containing job requirements across multiple data-related roles, including Data Analyst, Data Scientist, Data Engineer, BI Analyst, Machine Learning Engineer, and other emerging data careers. The goal was to understand skill demands, platforms you should always keep on check for employment, salary and the relationship between technical competencies and job categories</a:t>
             </a:r>
             <a:endParaRPr lang="en-KE" dirty="0"/>
           </a:p>
@@ -3938,7 +4188,7 @@
             </a:pPr>
             <a:r>
               <a:rPr lang="en-US" dirty="0"/>
-              <a:t>The job requirement dataset was unstructured, containing varied formats of skills, tools, and job descriptions.</a:t>
+              <a:t>The job requirement dataset was unstructured, containing different data types and formats of skills, tools, and job descriptions.</a:t>
             </a:r>
           </a:p>
           <a:p>

</xml_diff>